<commit_message>
updated branch in ppt
</commit_message>
<xml_diff>
--- a/Type Script v8.0.pptx
+++ b/Type Script v8.0.pptx
@@ -868,7 +868,7 @@
           <a:p>
             <a:fld id="{D4BA8270-C9CF-44CA-BE5A-02C2BDCCEDE4}" type="datetimeFigureOut">
               <a:rPr lang="en-GB" smtClean="0"/>
-              <a:t>05/10/2019</a:t>
+              <a:t>06/10/2019</a:t>
             </a:fld>
             <a:endParaRPr lang="en-GB"/>
           </a:p>
@@ -1119,7 +1119,7 @@
           <a:p>
             <a:fld id="{D4BA8270-C9CF-44CA-BE5A-02C2BDCCEDE4}" type="datetimeFigureOut">
               <a:rPr lang="en-GB" smtClean="0"/>
-              <a:t>05/10/2019</a:t>
+              <a:t>06/10/2019</a:t>
             </a:fld>
             <a:endParaRPr lang="en-GB"/>
           </a:p>
@@ -1433,7 +1433,7 @@
           <a:p>
             <a:fld id="{D4BA8270-C9CF-44CA-BE5A-02C2BDCCEDE4}" type="datetimeFigureOut">
               <a:rPr lang="en-GB" smtClean="0"/>
-              <a:t>05/10/2019</a:t>
+              <a:t>06/10/2019</a:t>
             </a:fld>
             <a:endParaRPr lang="en-GB"/>
           </a:p>
@@ -1774,7 +1774,7 @@
           <a:p>
             <a:fld id="{D4BA8270-C9CF-44CA-BE5A-02C2BDCCEDE4}" type="datetimeFigureOut">
               <a:rPr lang="en-GB" smtClean="0"/>
-              <a:t>05/10/2019</a:t>
+              <a:t>06/10/2019</a:t>
             </a:fld>
             <a:endParaRPr lang="en-GB"/>
           </a:p>
@@ -2088,7 +2088,7 @@
           <a:p>
             <a:fld id="{D4BA8270-C9CF-44CA-BE5A-02C2BDCCEDE4}" type="datetimeFigureOut">
               <a:rPr lang="en-GB" smtClean="0"/>
-              <a:t>05/10/2019</a:t>
+              <a:t>06/10/2019</a:t>
             </a:fld>
             <a:endParaRPr lang="en-GB"/>
           </a:p>
@@ -2481,7 +2481,7 @@
           <a:p>
             <a:fld id="{D4BA8270-C9CF-44CA-BE5A-02C2BDCCEDE4}" type="datetimeFigureOut">
               <a:rPr lang="en-GB" smtClean="0"/>
-              <a:t>05/10/2019</a:t>
+              <a:t>06/10/2019</a:t>
             </a:fld>
             <a:endParaRPr lang="en-GB"/>
           </a:p>
@@ -2651,7 +2651,7 @@
           <a:p>
             <a:fld id="{D4BA8270-C9CF-44CA-BE5A-02C2BDCCEDE4}" type="datetimeFigureOut">
               <a:rPr lang="en-GB" smtClean="0"/>
-              <a:t>05/10/2019</a:t>
+              <a:t>06/10/2019</a:t>
             </a:fld>
             <a:endParaRPr lang="en-GB"/>
           </a:p>
@@ -2831,7 +2831,7 @@
           <a:p>
             <a:fld id="{D4BA8270-C9CF-44CA-BE5A-02C2BDCCEDE4}" type="datetimeFigureOut">
               <a:rPr lang="en-GB" smtClean="0"/>
-              <a:t>05/10/2019</a:t>
+              <a:t>06/10/2019</a:t>
             </a:fld>
             <a:endParaRPr lang="en-GB"/>
           </a:p>
@@ -3007,7 +3007,7 @@
           <a:p>
             <a:fld id="{D4BA8270-C9CF-44CA-BE5A-02C2BDCCEDE4}" type="datetimeFigureOut">
               <a:rPr lang="en-GB" smtClean="0"/>
-              <a:t>05/10/2019</a:t>
+              <a:t>06/10/2019</a:t>
             </a:fld>
             <a:endParaRPr lang="en-GB"/>
           </a:p>
@@ -3254,7 +3254,7 @@
           <a:p>
             <a:fld id="{D4BA8270-C9CF-44CA-BE5A-02C2BDCCEDE4}" type="datetimeFigureOut">
               <a:rPr lang="en-GB" smtClean="0"/>
-              <a:t>05/10/2019</a:t>
+              <a:t>06/10/2019</a:t>
             </a:fld>
             <a:endParaRPr lang="en-GB"/>
           </a:p>
@@ -3486,7 +3486,7 @@
           <a:p>
             <a:fld id="{D4BA8270-C9CF-44CA-BE5A-02C2BDCCEDE4}" type="datetimeFigureOut">
               <a:rPr lang="en-GB" smtClean="0"/>
-              <a:t>05/10/2019</a:t>
+              <a:t>06/10/2019</a:t>
             </a:fld>
             <a:endParaRPr lang="en-GB"/>
           </a:p>
@@ -3860,7 +3860,7 @@
           <a:p>
             <a:fld id="{D4BA8270-C9CF-44CA-BE5A-02C2BDCCEDE4}" type="datetimeFigureOut">
               <a:rPr lang="en-GB" smtClean="0"/>
-              <a:t>05/10/2019</a:t>
+              <a:t>06/10/2019</a:t>
             </a:fld>
             <a:endParaRPr lang="en-GB"/>
           </a:p>
@@ -3983,7 +3983,7 @@
           <a:p>
             <a:fld id="{D4BA8270-C9CF-44CA-BE5A-02C2BDCCEDE4}" type="datetimeFigureOut">
               <a:rPr lang="en-GB" smtClean="0"/>
-              <a:t>05/10/2019</a:t>
+              <a:t>06/10/2019</a:t>
             </a:fld>
             <a:endParaRPr lang="en-GB"/>
           </a:p>
@@ -4078,7 +4078,7 @@
           <a:p>
             <a:fld id="{D4BA8270-C9CF-44CA-BE5A-02C2BDCCEDE4}" type="datetimeFigureOut">
               <a:rPr lang="en-GB" smtClean="0"/>
-              <a:t>05/10/2019</a:t>
+              <a:t>06/10/2019</a:t>
             </a:fld>
             <a:endParaRPr lang="en-GB"/>
           </a:p>
@@ -4333,7 +4333,7 @@
           <a:p>
             <a:fld id="{D4BA8270-C9CF-44CA-BE5A-02C2BDCCEDE4}" type="datetimeFigureOut">
               <a:rPr lang="en-GB" smtClean="0"/>
-              <a:t>05/10/2019</a:t>
+              <a:t>06/10/2019</a:t>
             </a:fld>
             <a:endParaRPr lang="en-GB"/>
           </a:p>
@@ -4596,7 +4596,7 @@
           <a:p>
             <a:fld id="{D4BA8270-C9CF-44CA-BE5A-02C2BDCCEDE4}" type="datetimeFigureOut">
               <a:rPr lang="en-GB" smtClean="0"/>
-              <a:t>05/10/2019</a:t>
+              <a:t>06/10/2019</a:t>
             </a:fld>
             <a:endParaRPr lang="en-GB"/>
           </a:p>
@@ -5339,7 +5339,7 @@
           <a:p>
             <a:fld id="{D4BA8270-C9CF-44CA-BE5A-02C2BDCCEDE4}" type="datetimeFigureOut">
               <a:rPr lang="en-GB" smtClean="0"/>
-              <a:t>05/10/2019</a:t>
+              <a:t>06/10/2019</a:t>
             </a:fld>
             <a:endParaRPr lang="en-GB"/>
           </a:p>
@@ -11132,15 +11132,7 @@
             </a:r>
             <a:r>
               <a:rPr lang="en-IN" dirty="0" smtClean="0"/>
-              <a:t> doesn’t support modules/import syntax </a:t>
-            </a:r>
-            <a:r>
-              <a:rPr lang="en-IN" dirty="0" smtClean="0"/>
-              <a:t>,we </a:t>
-            </a:r>
-            <a:r>
-              <a:rPr lang="en-IN" dirty="0" smtClean="0"/>
-              <a:t>can compile our multiple </a:t>
+              <a:t> doesn’t support modules/import syntax ,we can compile our multiple </a:t>
             </a:r>
             <a:r>
               <a:rPr lang="en-IN" dirty="0" err="1" smtClean="0"/>
@@ -11156,11 +11148,7 @@
             </a:r>
             <a:r>
               <a:rPr lang="en-IN" dirty="0" smtClean="0"/>
-              <a:t> files  </a:t>
-            </a:r>
-            <a:r>
-              <a:rPr lang="en-IN" dirty="0" smtClean="0"/>
-              <a:t>but we cant import </a:t>
+              <a:t> files  but we cant import </a:t>
             </a:r>
             <a:r>
               <a:rPr lang="en-IN" dirty="0" err="1" smtClean="0"/>
@@ -11276,8 +11264,35 @@
           <a:p>
             <a:r>
               <a:rPr lang="en-IN" dirty="0"/>
-              <a:t>We need to configure it in index.html</a:t>
-            </a:r>
+              <a:t>We need to configure it in </a:t>
+            </a:r>
+            <a:r>
+              <a:rPr lang="en-IN" dirty="0" smtClean="0"/>
+              <a:t>index.html</a:t>
+            </a:r>
+          </a:p>
+          <a:p>
+            <a:r>
+              <a:rPr lang="en-IN" dirty="0" smtClean="0"/>
+              <a:t>Demo using branches </a:t>
+            </a:r>
+            <a:r>
+              <a:rPr lang="en-IN" dirty="0" smtClean="0">
+                <a:hlinkClick r:id="rId2"/>
+              </a:rPr>
+              <a:t>modules</a:t>
+            </a:r>
+            <a:r>
+              <a:rPr lang="en-IN" dirty="0" smtClean="0"/>
+              <a:t> and </a:t>
+            </a:r>
+            <a:r>
+              <a:rPr lang="en-IN" dirty="0" smtClean="0">
+                <a:hlinkClick r:id="rId3"/>
+              </a:rPr>
+              <a:t>Advanced-modules</a:t>
+            </a:r>
+            <a:endParaRPr lang="en-IN" dirty="0"/>
           </a:p>
           <a:p>
             <a:endParaRPr lang="en-GB" b="1" i="1" dirty="0" smtClean="0">

</xml_diff>